<commit_message>
Updated text and references.
</commit_message>
<xml_diff>
--- a/images/Abbildungen-01.pptx
+++ b/images/Abbildungen-01.pptx
@@ -5,7 +5,7 @@
     <p:sldMasterId id="2147483648" r:id="rId1"/>
   </p:sldMasterIdLst>
   <p:notesMasterIdLst>
-    <p:notesMasterId r:id="rId18"/>
+    <p:notesMasterId r:id="rId19"/>
   </p:notesMasterIdLst>
   <p:sldIdLst>
     <p:sldId id="575" r:id="rId2"/>
@@ -24,6 +24,7 @@
     <p:sldId id="597" r:id="rId15"/>
     <p:sldId id="598" r:id="rId16"/>
     <p:sldId id="600" r:id="rId17"/>
+    <p:sldId id="602" r:id="rId18"/>
   </p:sldIdLst>
   <p:sldSz cx="12192000" cy="6858000"/>
   <p:notesSz cx="6858000" cy="9144000"/>
@@ -12030,7 +12031,7 @@
           <a:p>
             <a:fld id="{6C221AE3-2EA3-414F-B0D4-EF9EF6F6D40F}" type="datetimeFigureOut">
               <a:rPr lang="en-US" smtClean="0"/>
-              <a:t>7/10/2024</a:t>
+              <a:t>7/11/2024</a:t>
             </a:fld>
             <a:endParaRPr lang="en-US"/>
           </a:p>
@@ -12531,7 +12532,7 @@
           <a:p>
             <a:fld id="{54B74EF1-788F-47AB-9414-B0E30AA5E1A3}" type="datetimeFigureOut">
               <a:rPr lang="en-US" smtClean="0"/>
-              <a:t>7/10/2024</a:t>
+              <a:t>7/11/2024</a:t>
             </a:fld>
             <a:endParaRPr lang="en-US"/>
           </a:p>
@@ -12731,7 +12732,7 @@
           <a:p>
             <a:fld id="{54B74EF1-788F-47AB-9414-B0E30AA5E1A3}" type="datetimeFigureOut">
               <a:rPr lang="en-US" smtClean="0"/>
-              <a:t>7/10/2024</a:t>
+              <a:t>7/11/2024</a:t>
             </a:fld>
             <a:endParaRPr lang="en-US"/>
           </a:p>
@@ -12941,7 +12942,7 @@
           <a:p>
             <a:fld id="{54B74EF1-788F-47AB-9414-B0E30AA5E1A3}" type="datetimeFigureOut">
               <a:rPr lang="en-US" smtClean="0"/>
-              <a:t>7/10/2024</a:t>
+              <a:t>7/11/2024</a:t>
             </a:fld>
             <a:endParaRPr lang="en-US"/>
           </a:p>
@@ -13141,7 +13142,7 @@
           <a:p>
             <a:fld id="{54B74EF1-788F-47AB-9414-B0E30AA5E1A3}" type="datetimeFigureOut">
               <a:rPr lang="en-US" smtClean="0"/>
-              <a:t>7/10/2024</a:t>
+              <a:t>7/11/2024</a:t>
             </a:fld>
             <a:endParaRPr lang="en-US"/>
           </a:p>
@@ -13417,7 +13418,7 @@
           <a:p>
             <a:fld id="{54B74EF1-788F-47AB-9414-B0E30AA5E1A3}" type="datetimeFigureOut">
               <a:rPr lang="en-US" smtClean="0"/>
-              <a:t>7/10/2024</a:t>
+              <a:t>7/11/2024</a:t>
             </a:fld>
             <a:endParaRPr lang="en-US"/>
           </a:p>
@@ -13685,7 +13686,7 @@
           <a:p>
             <a:fld id="{54B74EF1-788F-47AB-9414-B0E30AA5E1A3}" type="datetimeFigureOut">
               <a:rPr lang="en-US" smtClean="0"/>
-              <a:t>7/10/2024</a:t>
+              <a:t>7/11/2024</a:t>
             </a:fld>
             <a:endParaRPr lang="en-US"/>
           </a:p>
@@ -14100,7 +14101,7 @@
           <a:p>
             <a:fld id="{54B74EF1-788F-47AB-9414-B0E30AA5E1A3}" type="datetimeFigureOut">
               <a:rPr lang="en-US" smtClean="0"/>
-              <a:t>7/10/2024</a:t>
+              <a:t>7/11/2024</a:t>
             </a:fld>
             <a:endParaRPr lang="en-US"/>
           </a:p>
@@ -14242,7 +14243,7 @@
           <a:p>
             <a:fld id="{54B74EF1-788F-47AB-9414-B0E30AA5E1A3}" type="datetimeFigureOut">
               <a:rPr lang="en-US" smtClean="0"/>
-              <a:t>7/10/2024</a:t>
+              <a:t>7/11/2024</a:t>
             </a:fld>
             <a:endParaRPr lang="en-US"/>
           </a:p>
@@ -14355,7 +14356,7 @@
           <a:p>
             <a:fld id="{54B74EF1-788F-47AB-9414-B0E30AA5E1A3}" type="datetimeFigureOut">
               <a:rPr lang="en-US" smtClean="0"/>
-              <a:t>7/10/2024</a:t>
+              <a:t>7/11/2024</a:t>
             </a:fld>
             <a:endParaRPr lang="en-US"/>
           </a:p>
@@ -14668,7 +14669,7 @@
           <a:p>
             <a:fld id="{54B74EF1-788F-47AB-9414-B0E30AA5E1A3}" type="datetimeFigureOut">
               <a:rPr lang="en-US" smtClean="0"/>
-              <a:t>7/10/2024</a:t>
+              <a:t>7/11/2024</a:t>
             </a:fld>
             <a:endParaRPr lang="en-US"/>
           </a:p>
@@ -14957,7 +14958,7 @@
           <a:p>
             <a:fld id="{54B74EF1-788F-47AB-9414-B0E30AA5E1A3}" type="datetimeFigureOut">
               <a:rPr lang="en-US" smtClean="0"/>
-              <a:t>7/10/2024</a:t>
+              <a:t>7/11/2024</a:t>
             </a:fld>
             <a:endParaRPr lang="en-US"/>
           </a:p>
@@ -15200,7 +15201,7 @@
           <a:p>
             <a:fld id="{54B74EF1-788F-47AB-9414-B0E30AA5E1A3}" type="datetimeFigureOut">
               <a:rPr lang="en-US" smtClean="0"/>
-              <a:t>7/10/2024</a:t>
+              <a:t>7/11/2024</a:t>
             </a:fld>
             <a:endParaRPr lang="en-US"/>
           </a:p>
@@ -20060,6 +20061,296 @@
     <p:extLst>
       <p:ext uri="{BB962C8B-B14F-4D97-AF65-F5344CB8AC3E}">
         <p14:creationId xmlns:p14="http://schemas.microsoft.com/office/powerpoint/2010/main" val="1575474026"/>
+      </p:ext>
+    </p:extLst>
+  </p:cSld>
+  <p:clrMapOvr>
+    <a:masterClrMapping/>
+  </p:clrMapOvr>
+</p:sld>
+</file>
+
+<file path=ppt/slides/slide17.xml><?xml version="1.0" encoding="utf-8"?>
+<p:sld xmlns:a="http://schemas.openxmlformats.org/drawingml/2006/main" xmlns:r="http://schemas.openxmlformats.org/officeDocument/2006/relationships" xmlns:p="http://schemas.openxmlformats.org/presentationml/2006/main">
+  <p:cSld>
+    <p:spTree>
+      <p:nvGrpSpPr>
+        <p:cNvPr id="1" name=""/>
+        <p:cNvGrpSpPr/>
+        <p:nvPr/>
+      </p:nvGrpSpPr>
+      <p:grpSpPr>
+        <a:xfrm>
+          <a:off x="0" y="0"/>
+          <a:ext cx="0" cy="0"/>
+          <a:chOff x="0" y="0"/>
+          <a:chExt cx="0" cy="0"/>
+        </a:xfrm>
+      </p:grpSpPr>
+      <p:sp>
+        <p:nvSpPr>
+          <p:cNvPr id="9" name="Pfeil: gebogen 8">
+            <a:extLst>
+              <a:ext uri="{FF2B5EF4-FFF2-40B4-BE49-F238E27FC236}">
+                <a16:creationId xmlns:a16="http://schemas.microsoft.com/office/drawing/2014/main" id="{E0BE2F3D-C024-4BE3-B5EB-5D3795F46652}"/>
+              </a:ext>
+            </a:extLst>
+          </p:cNvPr>
+          <p:cNvSpPr/>
+          <p:nvPr/>
+        </p:nvSpPr>
+        <p:spPr>
+          <a:xfrm rot="5400000">
+            <a:off x="6282267" y="2396066"/>
+            <a:ext cx="2065867" cy="2065867"/>
+          </a:xfrm>
+          <a:prstGeom prst="circularArrow">
+            <a:avLst/>
+          </a:prstGeom>
+        </p:spPr>
+        <p:style>
+          <a:lnRef idx="2">
+            <a:schemeClr val="accent1">
+              <a:shade val="50000"/>
+            </a:schemeClr>
+          </a:lnRef>
+          <a:fillRef idx="1">
+            <a:schemeClr val="accent1"/>
+          </a:fillRef>
+          <a:effectRef idx="0">
+            <a:schemeClr val="accent1"/>
+          </a:effectRef>
+          <a:fontRef idx="minor">
+            <a:schemeClr val="lt1"/>
+          </a:fontRef>
+        </p:style>
+        <p:txBody>
+          <a:bodyPr rtlCol="0" anchor="ctr"/>
+          <a:lstStyle/>
+          <a:p>
+            <a:pPr algn="ctr"/>
+            <a:endParaRPr lang="en-US" dirty="0">
+              <a:solidFill>
+                <a:schemeClr val="tx1"/>
+              </a:solidFill>
+            </a:endParaRPr>
+          </a:p>
+        </p:txBody>
+      </p:sp>
+      <p:sp>
+        <p:nvSpPr>
+          <p:cNvPr id="10" name="Pfeil: gebogen 9">
+            <a:extLst>
+              <a:ext uri="{FF2B5EF4-FFF2-40B4-BE49-F238E27FC236}">
+                <a16:creationId xmlns:a16="http://schemas.microsoft.com/office/drawing/2014/main" id="{018DC567-B6B6-485E-AE0F-67D329738949}"/>
+              </a:ext>
+            </a:extLst>
+          </p:cNvPr>
+          <p:cNvSpPr/>
+          <p:nvPr/>
+        </p:nvSpPr>
+        <p:spPr>
+          <a:xfrm rot="16200000">
+            <a:off x="3344333" y="2396066"/>
+            <a:ext cx="2065867" cy="2065867"/>
+          </a:xfrm>
+          <a:prstGeom prst="circularArrow">
+            <a:avLst/>
+          </a:prstGeom>
+        </p:spPr>
+        <p:style>
+          <a:lnRef idx="2">
+            <a:schemeClr val="accent1">
+              <a:shade val="50000"/>
+            </a:schemeClr>
+          </a:lnRef>
+          <a:fillRef idx="1">
+            <a:schemeClr val="accent1"/>
+          </a:fillRef>
+          <a:effectRef idx="0">
+            <a:schemeClr val="accent1"/>
+          </a:effectRef>
+          <a:fontRef idx="minor">
+            <a:schemeClr val="lt1"/>
+          </a:fontRef>
+        </p:style>
+        <p:txBody>
+          <a:bodyPr rtlCol="0" anchor="ctr"/>
+          <a:lstStyle/>
+          <a:p>
+            <a:pPr algn="ctr"/>
+            <a:endParaRPr lang="en-US">
+              <a:solidFill>
+                <a:schemeClr val="tx1"/>
+              </a:solidFill>
+            </a:endParaRPr>
+          </a:p>
+        </p:txBody>
+      </p:sp>
+      <p:sp>
+        <p:nvSpPr>
+          <p:cNvPr id="13" name="Textfeld 12">
+            <a:extLst>
+              <a:ext uri="{FF2B5EF4-FFF2-40B4-BE49-F238E27FC236}">
+                <a16:creationId xmlns:a16="http://schemas.microsoft.com/office/drawing/2014/main" id="{8E72CD1A-691D-47A9-A21C-A5F4F0ECCD39}"/>
+              </a:ext>
+            </a:extLst>
+          </p:cNvPr>
+          <p:cNvSpPr txBox="1"/>
+          <p:nvPr/>
+        </p:nvSpPr>
+        <p:spPr>
+          <a:xfrm>
+            <a:off x="4377267" y="2398464"/>
+            <a:ext cx="2843086" cy="369332"/>
+          </a:xfrm>
+          <a:prstGeom prst="rect">
+            <a:avLst/>
+          </a:prstGeom>
+          <a:noFill/>
+        </p:spPr>
+        <p:txBody>
+          <a:bodyPr wrap="none" rtlCol="0">
+            <a:spAutoFit/>
+          </a:bodyPr>
+          <a:lstStyle/>
+          <a:p>
+            <a:pPr algn="ctr"/>
+            <a:r>
+              <a:rPr lang="en-US" dirty="0"/>
+              <a:t>Allgemeine </a:t>
+            </a:r>
+            <a:r>
+              <a:rPr lang="en-US" dirty="0" err="1"/>
+              <a:t>Gesetzmäßigkeit</a:t>
+            </a:r>
+            <a:endParaRPr lang="en-US" dirty="0"/>
+          </a:p>
+        </p:txBody>
+      </p:sp>
+      <p:sp>
+        <p:nvSpPr>
+          <p:cNvPr id="14" name="Textfeld 13">
+            <a:extLst>
+              <a:ext uri="{FF2B5EF4-FFF2-40B4-BE49-F238E27FC236}">
+                <a16:creationId xmlns:a16="http://schemas.microsoft.com/office/drawing/2014/main" id="{37921CED-47DB-4D7D-851B-A370CE061B1F}"/>
+              </a:ext>
+            </a:extLst>
+          </p:cNvPr>
+          <p:cNvSpPr txBox="1"/>
+          <p:nvPr/>
+        </p:nvSpPr>
+        <p:spPr>
+          <a:xfrm>
+            <a:off x="4552122" y="4118001"/>
+            <a:ext cx="2493375" cy="369332"/>
+          </a:xfrm>
+          <a:prstGeom prst="rect">
+            <a:avLst/>
+          </a:prstGeom>
+          <a:noFill/>
+        </p:spPr>
+        <p:txBody>
+          <a:bodyPr wrap="none" rtlCol="0">
+            <a:spAutoFit/>
+          </a:bodyPr>
+          <a:lstStyle/>
+          <a:p>
+            <a:pPr algn="ctr"/>
+            <a:r>
+              <a:rPr lang="en-US" dirty="0" err="1"/>
+              <a:t>Einzelne</a:t>
+            </a:r>
+            <a:r>
+              <a:rPr lang="en-US" dirty="0"/>
+              <a:t> </a:t>
+            </a:r>
+            <a:r>
+              <a:rPr lang="en-US" dirty="0" err="1"/>
+              <a:t>Beobachtungen</a:t>
+            </a:r>
+            <a:endParaRPr lang="en-US" dirty="0"/>
+          </a:p>
+        </p:txBody>
+      </p:sp>
+      <p:sp>
+        <p:nvSpPr>
+          <p:cNvPr id="15" name="Textfeld 14">
+            <a:extLst>
+              <a:ext uri="{FF2B5EF4-FFF2-40B4-BE49-F238E27FC236}">
+                <a16:creationId xmlns:a16="http://schemas.microsoft.com/office/drawing/2014/main" id="{936DFF95-D6A7-469C-A068-20F7EFFB34B9}"/>
+              </a:ext>
+            </a:extLst>
+          </p:cNvPr>
+          <p:cNvSpPr txBox="1"/>
+          <p:nvPr/>
+        </p:nvSpPr>
+        <p:spPr>
+          <a:xfrm>
+            <a:off x="8348134" y="3244333"/>
+            <a:ext cx="1162947" cy="369332"/>
+          </a:xfrm>
+          <a:prstGeom prst="rect">
+            <a:avLst/>
+          </a:prstGeom>
+          <a:noFill/>
+        </p:spPr>
+        <p:txBody>
+          <a:bodyPr wrap="none" rtlCol="0">
+            <a:spAutoFit/>
+          </a:bodyPr>
+          <a:lstStyle/>
+          <a:p>
+            <a:pPr algn="ctr"/>
+            <a:r>
+              <a:rPr lang="en-US" dirty="0" err="1"/>
+              <a:t>Deduktion</a:t>
+            </a:r>
+            <a:endParaRPr lang="en-US" dirty="0"/>
+          </a:p>
+        </p:txBody>
+      </p:sp>
+      <p:sp>
+        <p:nvSpPr>
+          <p:cNvPr id="16" name="Textfeld 15">
+            <a:extLst>
+              <a:ext uri="{FF2B5EF4-FFF2-40B4-BE49-F238E27FC236}">
+                <a16:creationId xmlns:a16="http://schemas.microsoft.com/office/drawing/2014/main" id="{FCF24DF7-1C8D-4C12-977A-15098C0284C2}"/>
+              </a:ext>
+            </a:extLst>
+          </p:cNvPr>
+          <p:cNvSpPr txBox="1"/>
+          <p:nvPr/>
+        </p:nvSpPr>
+        <p:spPr>
+          <a:xfrm>
+            <a:off x="2282941" y="3244333"/>
+            <a:ext cx="1084399" cy="369332"/>
+          </a:xfrm>
+          <a:prstGeom prst="rect">
+            <a:avLst/>
+          </a:prstGeom>
+          <a:noFill/>
+        </p:spPr>
+        <p:txBody>
+          <a:bodyPr wrap="none" rtlCol="0">
+            <a:spAutoFit/>
+          </a:bodyPr>
+          <a:lstStyle/>
+          <a:p>
+            <a:pPr algn="ctr"/>
+            <a:r>
+              <a:rPr lang="en-US"/>
+              <a:t>Induktion</a:t>
+            </a:r>
+            <a:endParaRPr lang="en-US" dirty="0"/>
+          </a:p>
+        </p:txBody>
+      </p:sp>
+    </p:spTree>
+    <p:extLst>
+      <p:ext uri="{BB962C8B-B14F-4D97-AF65-F5344CB8AC3E}">
+        <p14:creationId xmlns:p14="http://schemas.microsoft.com/office/powerpoint/2010/main" val="1756088921"/>
       </p:ext>
     </p:extLst>
   </p:cSld>

</xml_diff>

<commit_message>
Removed large table (disziplin-zentrierte Diskussionen)
</commit_message>
<xml_diff>
--- a/images/Abbildungen-01.pptx
+++ b/images/Abbildungen-01.pptx
@@ -5,7 +5,7 @@
     <p:sldMasterId id="2147483648" r:id="rId1"/>
   </p:sldMasterIdLst>
   <p:notesMasterIdLst>
-    <p:notesMasterId r:id="rId19"/>
+    <p:notesMasterId r:id="rId20"/>
   </p:notesMasterIdLst>
   <p:sldIdLst>
     <p:sldId id="575" r:id="rId2"/>
@@ -25,6 +25,7 @@
     <p:sldId id="598" r:id="rId16"/>
     <p:sldId id="600" r:id="rId17"/>
     <p:sldId id="602" r:id="rId18"/>
+    <p:sldId id="603" r:id="rId19"/>
   </p:sldIdLst>
   <p:sldSz cx="12192000" cy="6858000"/>
   <p:notesSz cx="6858000" cy="9144000"/>
@@ -20089,6 +20090,58 @@
       </p:grpSpPr>
       <p:sp>
         <p:nvSpPr>
+          <p:cNvPr id="19" name="Rechteck 18">
+            <a:extLst>
+              <a:ext uri="{FF2B5EF4-FFF2-40B4-BE49-F238E27FC236}">
+                <a16:creationId xmlns:a16="http://schemas.microsoft.com/office/drawing/2014/main" id="{0AC8F850-0C79-41FF-B3BE-43F1CD2E1C08}"/>
+              </a:ext>
+            </a:extLst>
+          </p:cNvPr>
+          <p:cNvSpPr/>
+          <p:nvPr/>
+        </p:nvSpPr>
+        <p:spPr>
+          <a:xfrm>
+            <a:off x="1007533" y="1490133"/>
+            <a:ext cx="10083800" cy="3344334"/>
+          </a:xfrm>
+          <a:prstGeom prst="rect">
+            <a:avLst/>
+          </a:prstGeom>
+          <a:solidFill>
+            <a:schemeClr val="bg1"/>
+          </a:solidFill>
+          <a:ln>
+            <a:noFill/>
+          </a:ln>
+        </p:spPr>
+        <p:style>
+          <a:lnRef idx="2">
+            <a:schemeClr val="accent1">
+              <a:shade val="50000"/>
+            </a:schemeClr>
+          </a:lnRef>
+          <a:fillRef idx="1">
+            <a:schemeClr val="accent1"/>
+          </a:fillRef>
+          <a:effectRef idx="0">
+            <a:schemeClr val="accent1"/>
+          </a:effectRef>
+          <a:fontRef idx="minor">
+            <a:schemeClr val="lt1"/>
+          </a:fontRef>
+        </p:style>
+        <p:txBody>
+          <a:bodyPr rtlCol="0" anchor="ctr"/>
+          <a:lstStyle/>
+          <a:p>
+            <a:pPr algn="ctr"/>
+            <a:endParaRPr lang="en-US"/>
+          </a:p>
+        </p:txBody>
+      </p:sp>
+      <p:sp>
+        <p:nvSpPr>
           <p:cNvPr id="9" name="Pfeil: gebogen 8">
             <a:extLst>
               <a:ext uri="{FF2B5EF4-FFF2-40B4-BE49-F238E27FC236}">
@@ -20110,18 +20163,16 @@
         </p:spPr>
         <p:style>
           <a:lnRef idx="2">
-            <a:schemeClr val="accent1">
-              <a:shade val="50000"/>
-            </a:schemeClr>
+            <a:schemeClr val="dk1"/>
           </a:lnRef>
           <a:fillRef idx="1">
-            <a:schemeClr val="accent1"/>
+            <a:schemeClr val="lt1"/>
           </a:fillRef>
           <a:effectRef idx="0">
-            <a:schemeClr val="accent1"/>
+            <a:schemeClr val="dk1"/>
           </a:effectRef>
           <a:fontRef idx="minor">
-            <a:schemeClr val="lt1"/>
+            <a:schemeClr val="dk1"/>
           </a:fontRef>
         </p:style>
         <p:txBody>
@@ -20160,18 +20211,16 @@
         </p:spPr>
         <p:style>
           <a:lnRef idx="2">
-            <a:schemeClr val="accent1">
-              <a:shade val="50000"/>
-            </a:schemeClr>
+            <a:schemeClr val="dk1"/>
           </a:lnRef>
           <a:fillRef idx="1">
-            <a:schemeClr val="accent1"/>
+            <a:schemeClr val="lt1"/>
           </a:fillRef>
           <a:effectRef idx="0">
-            <a:schemeClr val="accent1"/>
+            <a:schemeClr val="dk1"/>
           </a:effectRef>
           <a:fontRef idx="minor">
-            <a:schemeClr val="lt1"/>
+            <a:schemeClr val="dk1"/>
           </a:fontRef>
         </p:style>
         <p:txBody>
@@ -20340,17 +20389,410 @@
           <a:p>
             <a:pPr algn="ctr"/>
             <a:r>
-              <a:rPr lang="en-US"/>
+              <a:rPr lang="en-US" dirty="0" err="1"/>
               <a:t>Induktion</a:t>
             </a:r>
             <a:endParaRPr lang="en-US" dirty="0"/>
           </a:p>
         </p:txBody>
       </p:sp>
+      <p:sp>
+        <p:nvSpPr>
+          <p:cNvPr id="17" name="Sprechblase: rechteckig 16">
+            <a:extLst>
+              <a:ext uri="{FF2B5EF4-FFF2-40B4-BE49-F238E27FC236}">
+                <a16:creationId xmlns:a16="http://schemas.microsoft.com/office/drawing/2014/main" id="{AC8C820F-A233-4ACC-9F84-730F646C8D45}"/>
+              </a:ext>
+            </a:extLst>
+          </p:cNvPr>
+          <p:cNvSpPr/>
+          <p:nvPr/>
+        </p:nvSpPr>
+        <p:spPr>
+          <a:xfrm>
+            <a:off x="8703732" y="1601000"/>
+            <a:ext cx="2065867" cy="1219200"/>
+          </a:xfrm>
+          <a:prstGeom prst="wedgeRectCallout">
+            <a:avLst>
+              <a:gd name="adj1" fmla="val -35997"/>
+              <a:gd name="adj2" fmla="val 75694"/>
+            </a:avLst>
+          </a:prstGeom>
+          <a:solidFill>
+            <a:schemeClr val="bg1">
+              <a:lumMod val="95000"/>
+            </a:schemeClr>
+          </a:solidFill>
+        </p:spPr>
+        <p:style>
+          <a:lnRef idx="2">
+            <a:schemeClr val="dk1"/>
+          </a:lnRef>
+          <a:fillRef idx="1">
+            <a:schemeClr val="lt1"/>
+          </a:fillRef>
+          <a:effectRef idx="0">
+            <a:schemeClr val="dk1"/>
+          </a:effectRef>
+          <a:fontRef idx="minor">
+            <a:schemeClr val="dk1"/>
+          </a:fontRef>
+        </p:style>
+        <p:txBody>
+          <a:bodyPr rtlCol="0" anchor="ctr"/>
+          <a:lstStyle/>
+          <a:p>
+            <a:pPr marL="285750" indent="-285750">
+              <a:buFontTx/>
+              <a:buChar char="-"/>
+            </a:pPr>
+            <a:r>
+              <a:rPr lang="en-US" sz="1200" dirty="0" err="1"/>
+              <a:t>Alle</a:t>
+            </a:r>
+            <a:r>
+              <a:rPr lang="en-US" sz="1200" dirty="0"/>
+              <a:t> Menschen </a:t>
+            </a:r>
+            <a:r>
+              <a:rPr lang="en-US" sz="1200" dirty="0" err="1"/>
+              <a:t>sind</a:t>
+            </a:r>
+            <a:r>
+              <a:rPr lang="en-US" sz="1200" dirty="0"/>
+              <a:t> </a:t>
+            </a:r>
+            <a:r>
+              <a:rPr lang="en-US" sz="1200" dirty="0" err="1"/>
+              <a:t>sterblich</a:t>
+            </a:r>
+            <a:r>
+              <a:rPr lang="en-US" sz="1200" dirty="0"/>
+              <a:t>.</a:t>
+            </a:r>
+          </a:p>
+          <a:p>
+            <a:pPr marL="285750" indent="-285750">
+              <a:buFontTx/>
+              <a:buChar char="-"/>
+            </a:pPr>
+            <a:r>
+              <a:rPr lang="en-US" sz="1200" dirty="0"/>
+              <a:t>Ich bin </a:t>
+            </a:r>
+            <a:r>
+              <a:rPr lang="en-US" sz="1200" dirty="0" err="1"/>
+              <a:t>ein</a:t>
+            </a:r>
+            <a:r>
+              <a:rPr lang="en-US" sz="1200" dirty="0"/>
+              <a:t> Mensch</a:t>
+            </a:r>
+          </a:p>
+          <a:p>
+            <a:r>
+              <a:rPr lang="en-US" sz="1200" dirty="0"/>
+              <a:t>____________________</a:t>
+            </a:r>
+          </a:p>
+          <a:p>
+            <a:r>
+              <a:rPr lang="en-US" sz="1200" dirty="0"/>
+              <a:t>Ich bin </a:t>
+            </a:r>
+            <a:r>
+              <a:rPr lang="en-US" sz="1200" dirty="0" err="1"/>
+              <a:t>sterblich</a:t>
+            </a:r>
+            <a:r>
+              <a:rPr lang="en-US" sz="1200" dirty="0"/>
+              <a:t>.</a:t>
+            </a:r>
+          </a:p>
+        </p:txBody>
+      </p:sp>
+      <p:sp>
+        <p:nvSpPr>
+          <p:cNvPr id="18" name="Sprechblase: rechteckig 17">
+            <a:extLst>
+              <a:ext uri="{FF2B5EF4-FFF2-40B4-BE49-F238E27FC236}">
+                <a16:creationId xmlns:a16="http://schemas.microsoft.com/office/drawing/2014/main" id="{81A93EDE-2BD5-41A0-9E05-3D834D536C71}"/>
+              </a:ext>
+            </a:extLst>
+          </p:cNvPr>
+          <p:cNvSpPr/>
+          <p:nvPr/>
+        </p:nvSpPr>
+        <p:spPr>
+          <a:xfrm>
+            <a:off x="1100667" y="1601000"/>
+            <a:ext cx="2065867" cy="1219200"/>
+          </a:xfrm>
+          <a:prstGeom prst="wedgeRectCallout">
+            <a:avLst>
+              <a:gd name="adj1" fmla="val 37364"/>
+              <a:gd name="adj2" fmla="val 75694"/>
+            </a:avLst>
+          </a:prstGeom>
+          <a:solidFill>
+            <a:schemeClr val="bg1">
+              <a:lumMod val="95000"/>
+            </a:schemeClr>
+          </a:solidFill>
+        </p:spPr>
+        <p:style>
+          <a:lnRef idx="2">
+            <a:schemeClr val="dk1"/>
+          </a:lnRef>
+          <a:fillRef idx="1">
+            <a:schemeClr val="lt1"/>
+          </a:fillRef>
+          <a:effectRef idx="0">
+            <a:schemeClr val="dk1"/>
+          </a:effectRef>
+          <a:fontRef idx="minor">
+            <a:schemeClr val="dk1"/>
+          </a:fontRef>
+        </p:style>
+        <p:txBody>
+          <a:bodyPr rtlCol="0" anchor="ctr"/>
+          <a:lstStyle/>
+          <a:p>
+            <a:r>
+              <a:rPr lang="en-US" sz="1200" dirty="0"/>
+              <a:t>In </a:t>
+            </a:r>
+            <a:r>
+              <a:rPr lang="en-US" sz="1200" dirty="0" err="1"/>
+              <a:t>diesem</a:t>
+            </a:r>
+            <a:r>
+              <a:rPr lang="en-US" sz="1200" dirty="0"/>
+              <a:t> </a:t>
+            </a:r>
+            <a:r>
+              <a:rPr lang="en-US" sz="1200" dirty="0" err="1"/>
+              <a:t>Wartezimmer</a:t>
+            </a:r>
+            <a:r>
+              <a:rPr lang="en-US" sz="1200" dirty="0"/>
+              <a:t> </a:t>
+            </a:r>
+            <a:r>
+              <a:rPr lang="en-US" sz="1200" dirty="0" err="1"/>
+              <a:t>sind</a:t>
+            </a:r>
+            <a:r>
+              <a:rPr lang="en-US" sz="1200" dirty="0"/>
+              <a:t> </a:t>
+            </a:r>
+            <a:r>
+              <a:rPr lang="en-US" sz="1200" dirty="0" err="1"/>
+              <a:t>mehr</a:t>
+            </a:r>
+            <a:r>
+              <a:rPr lang="en-US" sz="1200" dirty="0"/>
+              <a:t> Frauen </a:t>
+            </a:r>
+            <a:r>
+              <a:rPr lang="en-US" sz="1200" dirty="0" err="1"/>
+              <a:t>als</a:t>
+            </a:r>
+            <a:r>
+              <a:rPr lang="en-US" sz="1200" dirty="0"/>
+              <a:t> </a:t>
+            </a:r>
+            <a:r>
+              <a:rPr lang="en-US" sz="1200" dirty="0" err="1"/>
+              <a:t>Männer</a:t>
+            </a:r>
+            <a:r>
+              <a:rPr lang="en-US" sz="1200" dirty="0"/>
+              <a:t>.</a:t>
+            </a:r>
+          </a:p>
+          <a:p>
+            <a:r>
+              <a:rPr lang="en-US" sz="1200" dirty="0"/>
+              <a:t>____________________</a:t>
+            </a:r>
+          </a:p>
+          <a:p>
+            <a:r>
+              <a:rPr lang="en-US" sz="1200" dirty="0"/>
+              <a:t>In </a:t>
+            </a:r>
+            <a:r>
+              <a:rPr lang="en-US" sz="1200" dirty="0" err="1"/>
+              <a:t>allen</a:t>
+            </a:r>
+            <a:r>
+              <a:rPr lang="en-US" sz="1200" dirty="0"/>
+              <a:t> </a:t>
+            </a:r>
+            <a:r>
+              <a:rPr lang="en-US" sz="1200" dirty="0" err="1"/>
+              <a:t>Wartezimmern</a:t>
+            </a:r>
+            <a:r>
+              <a:rPr lang="en-US" sz="1200" dirty="0"/>
+              <a:t> </a:t>
+            </a:r>
+            <a:r>
+              <a:rPr lang="en-US" sz="1200" dirty="0" err="1"/>
+              <a:t>sind</a:t>
+            </a:r>
+            <a:r>
+              <a:rPr lang="en-US" sz="1200" dirty="0"/>
+              <a:t> </a:t>
+            </a:r>
+            <a:r>
+              <a:rPr lang="en-US" sz="1200" dirty="0" err="1"/>
+              <a:t>mehr</a:t>
+            </a:r>
+            <a:r>
+              <a:rPr lang="en-US" sz="1200" dirty="0"/>
+              <a:t> Frauen </a:t>
+            </a:r>
+            <a:r>
+              <a:rPr lang="en-US" sz="1200" dirty="0" err="1"/>
+              <a:t>als</a:t>
+            </a:r>
+            <a:r>
+              <a:rPr lang="en-US" sz="1200" dirty="0"/>
+              <a:t> </a:t>
+            </a:r>
+            <a:r>
+              <a:rPr lang="en-US" sz="1200" dirty="0" err="1"/>
+              <a:t>Männer</a:t>
+            </a:r>
+            <a:r>
+              <a:rPr lang="en-US" sz="1200" dirty="0"/>
+              <a:t>.</a:t>
+            </a:r>
+          </a:p>
+        </p:txBody>
+      </p:sp>
+      <p:pic>
+        <p:nvPicPr>
+          <p:cNvPr id="20" name="Grafik 19">
+            <a:extLst>
+              <a:ext uri="{FF2B5EF4-FFF2-40B4-BE49-F238E27FC236}">
+                <a16:creationId xmlns:a16="http://schemas.microsoft.com/office/drawing/2014/main" id="{3FED1587-0DC7-4F2B-904B-3849E6D049B4}"/>
+              </a:ext>
+            </a:extLst>
+          </p:cNvPr>
+          <p:cNvPicPr>
+            <a:picLocks noChangeAspect="1"/>
+          </p:cNvPicPr>
+          <p:nvPr/>
+        </p:nvPicPr>
+        <p:blipFill>
+          <a:blip r:embed="rId2"/>
+          <a:stretch>
+            <a:fillRect/>
+          </a:stretch>
+        </p:blipFill>
+        <p:spPr>
+          <a:xfrm>
+            <a:off x="1147305" y="2583130"/>
+            <a:ext cx="10083658" cy="3346994"/>
+          </a:xfrm>
+          <a:prstGeom prst="rect">
+            <a:avLst/>
+          </a:prstGeom>
+        </p:spPr>
+      </p:pic>
     </p:spTree>
     <p:extLst>
       <p:ext uri="{BB962C8B-B14F-4D97-AF65-F5344CB8AC3E}">
         <p14:creationId xmlns:p14="http://schemas.microsoft.com/office/powerpoint/2010/main" val="1756088921"/>
+      </p:ext>
+    </p:extLst>
+  </p:cSld>
+  <p:clrMapOvr>
+    <a:masterClrMapping/>
+  </p:clrMapOvr>
+</p:sld>
+</file>
+
+<file path=ppt/slides/slide18.xml><?xml version="1.0" encoding="utf-8"?>
+<p:sld xmlns:a="http://schemas.openxmlformats.org/drawingml/2006/main" xmlns:r="http://schemas.openxmlformats.org/officeDocument/2006/relationships" xmlns:p="http://schemas.openxmlformats.org/presentationml/2006/main">
+  <p:cSld>
+    <p:spTree>
+      <p:nvGrpSpPr>
+        <p:cNvPr id="1" name=""/>
+        <p:cNvGrpSpPr/>
+        <p:nvPr/>
+      </p:nvGrpSpPr>
+      <p:grpSpPr>
+        <a:xfrm>
+          <a:off x="0" y="0"/>
+          <a:ext cx="0" cy="0"/>
+          <a:chOff x="0" y="0"/>
+          <a:chExt cx="0" cy="0"/>
+        </a:xfrm>
+      </p:grpSpPr>
+      <p:sp>
+        <p:nvSpPr>
+          <p:cNvPr id="7" name="Inhaltsplatzhalter 6">
+            <a:extLst>
+              <a:ext uri="{FF2B5EF4-FFF2-40B4-BE49-F238E27FC236}">
+                <a16:creationId xmlns:a16="http://schemas.microsoft.com/office/drawing/2014/main" id="{CBF203BE-B0FE-4076-8AC9-3993BCE185DD}"/>
+              </a:ext>
+            </a:extLst>
+          </p:cNvPr>
+          <p:cNvSpPr>
+            <a:spLocks noGrp="1"/>
+          </p:cNvSpPr>
+          <p:nvPr>
+            <p:ph idx="1"/>
+          </p:nvPr>
+        </p:nvSpPr>
+        <p:spPr/>
+        <p:txBody>
+          <a:bodyPr/>
+          <a:lstStyle/>
+          <a:p>
+            <a:endParaRPr lang="en-US"/>
+          </a:p>
+        </p:txBody>
+      </p:sp>
+      <p:pic>
+        <p:nvPicPr>
+          <p:cNvPr id="8" name="Grafik 7">
+            <a:extLst>
+              <a:ext uri="{FF2B5EF4-FFF2-40B4-BE49-F238E27FC236}">
+                <a16:creationId xmlns:a16="http://schemas.microsoft.com/office/drawing/2014/main" id="{E02414A1-15D8-4A87-9D57-D937AEAFE5E4}"/>
+              </a:ext>
+            </a:extLst>
+          </p:cNvPr>
+          <p:cNvPicPr>
+            <a:picLocks noChangeAspect="1"/>
+          </p:cNvPicPr>
+          <p:nvPr/>
+        </p:nvPicPr>
+        <p:blipFill>
+          <a:blip r:embed="rId2"/>
+          <a:stretch>
+            <a:fillRect/>
+          </a:stretch>
+        </p:blipFill>
+        <p:spPr>
+          <a:xfrm>
+            <a:off x="3904298" y="1203767"/>
+            <a:ext cx="4383404" cy="4450466"/>
+          </a:xfrm>
+          <a:prstGeom prst="rect">
+            <a:avLst/>
+          </a:prstGeom>
+        </p:spPr>
+      </p:pic>
+    </p:spTree>
+    <p:extLst>
+      <p:ext uri="{BB962C8B-B14F-4D97-AF65-F5344CB8AC3E}">
+        <p14:creationId xmlns:p14="http://schemas.microsoft.com/office/powerpoint/2010/main" val="4094071385"/>
       </p:ext>
     </p:extLst>
   </p:cSld>

</xml_diff>